<commit_message>
Added example screenshot to presentation
</commit_message>
<xml_diff>
--- a/presentation.pptx
+++ b/presentation.pptx
@@ -7,7 +7,8 @@
   <p:sldIdLst>
     <p:sldId id="256" r:id="rId2"/>
     <p:sldId id="257" r:id="rId3"/>
-    <p:sldId id="258" r:id="rId4"/>
+    <p:sldId id="259" r:id="rId4"/>
+    <p:sldId id="258" r:id="rId5"/>
   </p:sldIdLst>
   <p:sldSz cx="12192000" cy="6858000"/>
   <p:notesSz cx="6858000" cy="9144000"/>
@@ -3556,6 +3557,66 @@
           <a:chExt cx="0" cy="0"/>
         </a:xfrm>
       </p:grpSpPr>
+      <p:pic>
+        <p:nvPicPr>
+          <p:cNvPr id="4" name="Picture 3">
+            <a:extLst>
+              <a:ext uri="{FF2B5EF4-FFF2-40B4-BE49-F238E27FC236}">
+                <a16:creationId xmlns:a16="http://schemas.microsoft.com/office/drawing/2014/main" id="{C2970E29-4969-4DD2-8B17-BC77D62231DA}"/>
+              </a:ext>
+            </a:extLst>
+          </p:cNvPr>
+          <p:cNvPicPr>
+            <a:picLocks noChangeAspect="1"/>
+          </p:cNvPicPr>
+          <p:nvPr/>
+        </p:nvPicPr>
+        <p:blipFill>
+          <a:blip r:embed="rId2"/>
+          <a:stretch>
+            <a:fillRect/>
+          </a:stretch>
+        </p:blipFill>
+        <p:spPr>
+          <a:xfrm>
+            <a:off x="1911901" y="0"/>
+            <a:ext cx="8368198" cy="6858000"/>
+          </a:xfrm>
+          <a:prstGeom prst="rect">
+            <a:avLst/>
+          </a:prstGeom>
+        </p:spPr>
+      </p:pic>
+    </p:spTree>
+    <p:extLst>
+      <p:ext uri="{BB962C8B-B14F-4D97-AF65-F5344CB8AC3E}">
+        <p14:creationId xmlns:p14="http://schemas.microsoft.com/office/powerpoint/2010/main" val="3050736836"/>
+      </p:ext>
+    </p:extLst>
+  </p:cSld>
+  <p:clrMapOvr>
+    <a:masterClrMapping/>
+  </p:clrMapOvr>
+</p:sld>
+</file>
+
+<file path=ppt/slides/slide4.xml><?xml version="1.0" encoding="utf-8"?>
+<p:sld xmlns:a="http://schemas.openxmlformats.org/drawingml/2006/main" xmlns:r="http://schemas.openxmlformats.org/officeDocument/2006/relationships" xmlns:p="http://schemas.openxmlformats.org/presentationml/2006/main">
+  <p:cSld>
+    <p:spTree>
+      <p:nvGrpSpPr>
+        <p:cNvPr id="1" name=""/>
+        <p:cNvGrpSpPr/>
+        <p:nvPr/>
+      </p:nvGrpSpPr>
+      <p:grpSpPr>
+        <a:xfrm>
+          <a:off x="0" y="0"/>
+          <a:ext cx="0" cy="0"/>
+          <a:chOff x="0" y="0"/>
+          <a:chExt cx="0" cy="0"/>
+        </a:xfrm>
+      </p:grpSpPr>
       <p:sp>
         <p:nvSpPr>
           <p:cNvPr id="2" name="Title 1">

</xml_diff>

<commit_message>
Wrote conclusion to presentation
</commit_message>
<xml_diff>
--- a/presentation.pptx
+++ b/presentation.pptx
@@ -9,6 +9,7 @@
     <p:sldId id="257" r:id="rId3"/>
     <p:sldId id="259" r:id="rId4"/>
     <p:sldId id="258" r:id="rId5"/>
+    <p:sldId id="260" r:id="rId6"/>
   </p:sldIdLst>
   <p:sldSz cx="12192000" cy="6858000"/>
   <p:notesSz cx="6858000" cy="9144000"/>
@@ -3700,12 +3701,118 @@
             </a:r>
             <a:endParaRPr lang="en-CA" dirty="0"/>
           </a:p>
+          <a:p>
+            <a:r>
+              <a:rPr lang="en-CA" dirty="0"/>
+              <a:t>git was used for version control</a:t>
+            </a:r>
+          </a:p>
         </p:txBody>
       </p:sp>
     </p:spTree>
     <p:extLst>
       <p:ext uri="{BB962C8B-B14F-4D97-AF65-F5344CB8AC3E}">
         <p14:creationId xmlns:p14="http://schemas.microsoft.com/office/powerpoint/2010/main" val="716681191"/>
+      </p:ext>
+    </p:extLst>
+  </p:cSld>
+  <p:clrMapOvr>
+    <a:masterClrMapping/>
+  </p:clrMapOvr>
+</p:sld>
+</file>
+
+<file path=ppt/slides/slide5.xml><?xml version="1.0" encoding="utf-8"?>
+<p:sld xmlns:a="http://schemas.openxmlformats.org/drawingml/2006/main" xmlns:r="http://schemas.openxmlformats.org/officeDocument/2006/relationships" xmlns:p="http://schemas.openxmlformats.org/presentationml/2006/main">
+  <p:cSld>
+    <p:spTree>
+      <p:nvGrpSpPr>
+        <p:cNvPr id="1" name=""/>
+        <p:cNvGrpSpPr/>
+        <p:nvPr/>
+      </p:nvGrpSpPr>
+      <p:grpSpPr>
+        <a:xfrm>
+          <a:off x="0" y="0"/>
+          <a:ext cx="0" cy="0"/>
+          <a:chOff x="0" y="0"/>
+          <a:chExt cx="0" cy="0"/>
+        </a:xfrm>
+      </p:grpSpPr>
+      <p:sp>
+        <p:nvSpPr>
+          <p:cNvPr id="2" name="Title 1">
+            <a:extLst>
+              <a:ext uri="{FF2B5EF4-FFF2-40B4-BE49-F238E27FC236}">
+                <a16:creationId xmlns:a16="http://schemas.microsoft.com/office/drawing/2014/main" id="{1FC3E31D-C0B0-4244-ACBD-C0B04CFCDCD5}"/>
+              </a:ext>
+            </a:extLst>
+          </p:cNvPr>
+          <p:cNvSpPr>
+            <a:spLocks noGrp="1"/>
+          </p:cNvSpPr>
+          <p:nvPr>
+            <p:ph type="title"/>
+          </p:nvPr>
+        </p:nvSpPr>
+        <p:spPr/>
+        <p:txBody>
+          <a:bodyPr/>
+          <a:lstStyle/>
+          <a:p>
+            <a:r>
+              <a:rPr lang="en-US" dirty="0"/>
+              <a:t>Conclusion</a:t>
+            </a:r>
+            <a:endParaRPr lang="en-CA" dirty="0"/>
+          </a:p>
+        </p:txBody>
+      </p:sp>
+      <p:sp>
+        <p:nvSpPr>
+          <p:cNvPr id="3" name="Content Placeholder 2">
+            <a:extLst>
+              <a:ext uri="{FF2B5EF4-FFF2-40B4-BE49-F238E27FC236}">
+                <a16:creationId xmlns:a16="http://schemas.microsoft.com/office/drawing/2014/main" id="{EA11C47F-D5FF-4450-B3D6-0C789AFDCB5E}"/>
+              </a:ext>
+            </a:extLst>
+          </p:cNvPr>
+          <p:cNvSpPr>
+            <a:spLocks noGrp="1"/>
+          </p:cNvSpPr>
+          <p:nvPr>
+            <p:ph idx="1"/>
+          </p:nvPr>
+        </p:nvSpPr>
+        <p:spPr/>
+        <p:txBody>
+          <a:bodyPr/>
+          <a:lstStyle/>
+          <a:p>
+            <a:r>
+              <a:rPr lang="en-US" dirty="0"/>
+              <a:t>Project functions as initially desired</a:t>
+            </a:r>
+          </a:p>
+          <a:p>
+            <a:r>
+              <a:rPr lang="en-US" dirty="0"/>
+              <a:t>Learned a lot about socket programming and multi-threading</a:t>
+            </a:r>
+          </a:p>
+          <a:p>
+            <a:r>
+              <a:rPr lang="en-US" dirty="0"/>
+              <a:t>Thanks for listening</a:t>
+            </a:r>
+            <a:endParaRPr lang="en-CA" dirty="0"/>
+          </a:p>
+        </p:txBody>
+      </p:sp>
+    </p:spTree>
+    <p:extLst>
+      <p:ext uri="{BB962C8B-B14F-4D97-AF65-F5344CB8AC3E}">
+        <p14:creationId xmlns:p14="http://schemas.microsoft.com/office/powerpoint/2010/main" val="17296543"/>
       </p:ext>
     </p:extLst>
   </p:cSld>

</xml_diff>